<commit_message>
Updated power point, only need to add file exporting image now
</commit_message>
<xml_diff>
--- a/AEDA_-_Cartao_Museus_de_Portugal_parte_2.pptx
+++ b/AEDA_-_Cartao_Museus_de_Portugal_parte_2.pptx
@@ -206,7 +206,7 @@
           <a:p>
             <a:fld id="{34BD70C7-4E8C-4886-A885-5C4875E9B61A}" type="datetimeFigureOut">
               <a:rPr lang="pt-PT" smtClean="0"/>
-              <a:t>01/01/2020</a:t>
+              <a:t>02/01/2020</a:t>
             </a:fld>
             <a:endParaRPr lang="pt-PT"/>
           </a:p>
@@ -365,7 +365,7 @@
           <a:p>
             <a:fld id="{2991BF60-D1CF-43CF-94A6-F80ED6A8E0B7}" type="slidenum">
               <a:rPr lang="pt-PT" smtClean="0"/>
-              <a:t>‹#›</a:t>
+              <a:t>‹nº›</a:t>
             </a:fld>
             <a:endParaRPr lang="pt-PT"/>
           </a:p>
@@ -896,7 +896,7 @@
             <a:fld id="{87DE6118-2437-4B30-8E3C-4D2BE6020583}" type="datetimeFigureOut">
               <a:rPr lang="en-US" smtClean="0"/>
               <a:pPr/>
-              <a:t>1/1/2020</a:t>
+              <a:t>1/2/2020</a:t>
             </a:fld>
             <a:endParaRPr lang="en-US" dirty="0"/>
           </a:p>
@@ -965,7 +965,7 @@
             <a:fld id="{69E57DC2-970A-4B3E-BB1C-7A09969E49DF}" type="slidenum">
               <a:rPr lang="en-US" smtClean="0"/>
               <a:pPr/>
-              <a:t>‹#›</a:t>
+              <a:t>‹nº›</a:t>
             </a:fld>
             <a:endParaRPr lang="en-US" dirty="0"/>
           </a:p>
@@ -1228,7 +1228,7 @@
             <a:fld id="{87DE6118-2437-4B30-8E3C-4D2BE6020583}" type="datetimeFigureOut">
               <a:rPr lang="en-US" smtClean="0"/>
               <a:pPr/>
-              <a:t>1/1/2020</a:t>
+              <a:t>1/2/2020</a:t>
             </a:fld>
             <a:endParaRPr lang="en-US" dirty="0"/>
           </a:p>
@@ -1271,7 +1271,7 @@
             <a:fld id="{69E57DC2-970A-4B3E-BB1C-7A09969E49DF}" type="slidenum">
               <a:rPr lang="en-US" smtClean="0"/>
               <a:pPr/>
-              <a:t>‹#›</a:t>
+              <a:t>‹nº›</a:t>
             </a:fld>
             <a:endParaRPr lang="en-US" dirty="0"/>
           </a:p>
@@ -1410,7 +1410,7 @@
             <a:fld id="{87DE6118-2437-4B30-8E3C-4D2BE6020583}" type="datetimeFigureOut">
               <a:rPr lang="en-US" smtClean="0"/>
               <a:pPr/>
-              <a:t>1/1/2020</a:t>
+              <a:t>1/2/2020</a:t>
             </a:fld>
             <a:endParaRPr lang="en-US" dirty="0"/>
           </a:p>
@@ -1453,7 +1453,7 @@
             <a:fld id="{69E57DC2-970A-4B3E-BB1C-7A09969E49DF}" type="slidenum">
               <a:rPr lang="en-US" smtClean="0"/>
               <a:pPr/>
-              <a:t>‹#›</a:t>
+              <a:t>‹nº›</a:t>
             </a:fld>
             <a:endParaRPr lang="en-US" dirty="0"/>
           </a:p>
@@ -1582,7 +1582,7 @@
             <a:fld id="{87DE6118-2437-4B30-8E3C-4D2BE6020583}" type="datetimeFigureOut">
               <a:rPr lang="en-US" smtClean="0"/>
               <a:pPr/>
-              <a:t>1/1/2020</a:t>
+              <a:t>1/2/2020</a:t>
             </a:fld>
             <a:endParaRPr lang="en-US" dirty="0"/>
           </a:p>
@@ -1625,7 +1625,7 @@
             <a:fld id="{69E57DC2-970A-4B3E-BB1C-7A09969E49DF}" type="slidenum">
               <a:rPr lang="en-US" smtClean="0"/>
               <a:pPr/>
-              <a:t>‹#›</a:t>
+              <a:t>‹nº›</a:t>
             </a:fld>
             <a:endParaRPr lang="en-US" dirty="0"/>
           </a:p>
@@ -1861,7 +1861,7 @@
             <a:fld id="{87DE6118-2437-4B30-8E3C-4D2BE6020583}" type="datetimeFigureOut">
               <a:rPr lang="en-US" smtClean="0"/>
               <a:pPr/>
-              <a:t>1/1/2020</a:t>
+              <a:t>1/2/2020</a:t>
             </a:fld>
             <a:endParaRPr lang="en-US" dirty="0"/>
           </a:p>
@@ -1930,7 +1930,7 @@
             <a:fld id="{69E57DC2-970A-4B3E-BB1C-7A09969E49DF}" type="slidenum">
               <a:rPr lang="en-US" smtClean="0"/>
               <a:pPr/>
-              <a:t>‹#›</a:t>
+              <a:t>‹nº›</a:t>
             </a:fld>
             <a:endParaRPr lang="en-US" dirty="0"/>
           </a:p>
@@ -2257,7 +2257,7 @@
             <a:fld id="{87DE6118-2437-4B30-8E3C-4D2BE6020583}" type="datetimeFigureOut">
               <a:rPr lang="en-US" smtClean="0"/>
               <a:pPr/>
-              <a:t>1/1/2020</a:t>
+              <a:t>1/2/2020</a:t>
             </a:fld>
             <a:endParaRPr lang="en-US" dirty="0"/>
           </a:p>
@@ -2300,7 +2300,7 @@
             <a:fld id="{69E57DC2-970A-4B3E-BB1C-7A09969E49DF}" type="slidenum">
               <a:rPr lang="en-US" smtClean="0"/>
               <a:pPr/>
-              <a:t>‹#›</a:t>
+              <a:t>‹nº›</a:t>
             </a:fld>
             <a:endParaRPr lang="en-US" dirty="0"/>
           </a:p>
@@ -2736,7 +2736,7 @@
             <a:fld id="{87DE6118-2437-4B30-8E3C-4D2BE6020583}" type="datetimeFigureOut">
               <a:rPr lang="en-US" smtClean="0"/>
               <a:pPr/>
-              <a:t>1/1/2020</a:t>
+              <a:t>1/2/2020</a:t>
             </a:fld>
             <a:endParaRPr lang="en-US" dirty="0"/>
           </a:p>
@@ -2779,7 +2779,7 @@
             <a:fld id="{69E57DC2-970A-4B3E-BB1C-7A09969E49DF}" type="slidenum">
               <a:rPr lang="en-US" smtClean="0"/>
               <a:pPr/>
-              <a:t>‹#›</a:t>
+              <a:t>‹nº›</a:t>
             </a:fld>
             <a:endParaRPr lang="en-US" dirty="0"/>
           </a:p>
@@ -2856,7 +2856,7 @@
             <a:fld id="{87DE6118-2437-4B30-8E3C-4D2BE6020583}" type="datetimeFigureOut">
               <a:rPr lang="en-US" smtClean="0"/>
               <a:pPr/>
-              <a:t>1/1/2020</a:t>
+              <a:t>1/2/2020</a:t>
             </a:fld>
             <a:endParaRPr lang="en-US" dirty="0"/>
           </a:p>
@@ -2899,7 +2899,7 @@
             <a:fld id="{69E57DC2-970A-4B3E-BB1C-7A09969E49DF}" type="slidenum">
               <a:rPr lang="en-US" smtClean="0"/>
               <a:pPr/>
-              <a:t>‹#›</a:t>
+              <a:t>‹nº›</a:t>
             </a:fld>
             <a:endParaRPr lang="en-US" dirty="0"/>
           </a:p>
@@ -2953,7 +2953,7 @@
             <a:fld id="{87DE6118-2437-4B30-8E3C-4D2BE6020583}" type="datetimeFigureOut">
               <a:rPr lang="en-US" smtClean="0"/>
               <a:pPr/>
-              <a:t>1/1/2020</a:t>
+              <a:t>1/2/2020</a:t>
             </a:fld>
             <a:endParaRPr lang="en-US" dirty="0"/>
           </a:p>
@@ -2996,7 +2996,7 @@
             <a:fld id="{69E57DC2-970A-4B3E-BB1C-7A09969E49DF}" type="slidenum">
               <a:rPr lang="en-US" smtClean="0"/>
               <a:pPr/>
-              <a:t>‹#›</a:t>
+              <a:t>‹nº›</a:t>
             </a:fld>
             <a:endParaRPr lang="en-US" dirty="0"/>
           </a:p>
@@ -3301,7 +3301,7 @@
             <a:fld id="{87DE6118-2437-4B30-8E3C-4D2BE6020583}" type="datetimeFigureOut">
               <a:rPr lang="en-US" smtClean="0"/>
               <a:pPr/>
-              <a:t>1/1/2020</a:t>
+              <a:t>1/2/2020</a:t>
             </a:fld>
             <a:endParaRPr lang="en-US" dirty="0"/>
           </a:p>
@@ -3370,7 +3370,7 @@
             <a:fld id="{69E57DC2-970A-4B3E-BB1C-7A09969E49DF}" type="slidenum">
               <a:rPr lang="en-US" smtClean="0"/>
               <a:pPr/>
-              <a:t>‹#›</a:t>
+              <a:t>‹nº›</a:t>
             </a:fld>
             <a:endParaRPr lang="en-US" dirty="0"/>
           </a:p>
@@ -3690,7 +3690,7 @@
             <a:fld id="{87DE6118-2437-4B30-8E3C-4D2BE6020583}" type="datetimeFigureOut">
               <a:rPr lang="en-US" smtClean="0"/>
               <a:pPr/>
-              <a:t>1/1/2020</a:t>
+              <a:t>1/2/2020</a:t>
             </a:fld>
             <a:endParaRPr lang="en-US" dirty="0"/>
           </a:p>
@@ -3759,7 +3759,7 @@
             <a:fld id="{69E57DC2-970A-4B3E-BB1C-7A09969E49DF}" type="slidenum">
               <a:rPr lang="en-US" smtClean="0"/>
               <a:pPr/>
-              <a:t>‹#›</a:t>
+              <a:t>‹nº›</a:t>
             </a:fld>
             <a:endParaRPr lang="en-US" dirty="0"/>
           </a:p>
@@ -3970,7 +3970,7 @@
             <a:fld id="{87DE6118-2437-4B30-8E3C-4D2BE6020583}" type="datetimeFigureOut">
               <a:rPr lang="en-US" smtClean="0"/>
               <a:pPr/>
-              <a:t>1/1/2020</a:t>
+              <a:t>1/2/2020</a:t>
             </a:fld>
             <a:endParaRPr lang="en-US" dirty="0"/>
           </a:p>
@@ -4045,7 +4045,7 @@
             <a:fld id="{69E57DC2-970A-4B3E-BB1C-7A09969E49DF}" type="slidenum">
               <a:rPr lang="en-US" smtClean="0"/>
               <a:pPr/>
-              <a:t>‹#›</a:t>
+              <a:t>‹nº›</a:t>
             </a:fld>
             <a:endParaRPr lang="en-US" dirty="0"/>
           </a:p>
@@ -5122,7 +5122,39 @@
                   <a:schemeClr val="tx1"/>
                 </a:solidFill>
               </a:rPr>
-              <a:t>Tal como pedido, os Museus numa BST (std::set), as Empresas de Reparação numa priority queue (std::priority_queue) e os Trabalhadores do estado numa hashtable (std::unordered_set)</a:t>
+              <a:t>Tal como pedido, os Museus numa BST (std::set), as Empresas de Reparação numa priority queue (std::priority_queue) e os Trabalhadores do estado numa </a:t>
+            </a:r>
+            <a:r>
+              <a:rPr lang="pt-PT" sz="1800" i="0" dirty="0" err="1">
+                <a:solidFill>
+                  <a:schemeClr val="tx1"/>
+                </a:solidFill>
+              </a:rPr>
+              <a:t>hashtable</a:t>
+            </a:r>
+            <a:r>
+              <a:rPr lang="pt-PT" sz="1800" i="0" dirty="0">
+                <a:solidFill>
+                  <a:schemeClr val="tx1"/>
+                </a:solidFill>
+              </a:rPr>
+              <a:t> (std::</a:t>
+            </a:r>
+            <a:r>
+              <a:rPr lang="pt-PT" sz="1800" i="0" dirty="0" err="1">
+                <a:solidFill>
+                  <a:schemeClr val="tx1"/>
+                </a:solidFill>
+              </a:rPr>
+              <a:t>unordered_set</a:t>
+            </a:r>
+            <a:r>
+              <a:rPr lang="pt-PT" sz="1800" i="0" dirty="0">
+                <a:solidFill>
+                  <a:schemeClr val="tx1"/>
+                </a:solidFill>
+              </a:rPr>
+              <a:t>).</a:t>
             </a:r>
           </a:p>
           <a:p>
@@ -5585,7 +5617,7 @@
                   <a:schemeClr val="tx1"/>
                 </a:solidFill>
               </a:rPr>
-              <a:t>As funcionalidades de CRUD foram mantidas para as antigas classes (Museus, Empresas de Eventos, Cartões e Eventos) e foram completamente implementadas para Trabalhadores do Estado e Empresas de Reparações</a:t>
+              <a:t>As funcionalidades de CRUD foram mantidas (pois já estavam completas na totalidade) para as antigas classes (Museus, Empresas de Eventos, Cartões e Eventos) e foram completamente implementadas para Trabalhadores do Estado e Empresas de Reparações.</a:t>
             </a:r>
           </a:p>
           <a:p>
@@ -5606,7 +5638,7 @@
                   <a:schemeClr val="tx1"/>
                 </a:solidFill>
               </a:rPr>
-              <a:t>Contratação e despedimento de Trabalhadores do Estado</a:t>
+              <a:t>Contratação e despedimento de Trabalhadores do Estado.</a:t>
             </a:r>
           </a:p>
           <a:p>
@@ -5617,8 +5649,30 @@
                   <a:schemeClr val="tx1"/>
                 </a:solidFill>
               </a:rPr>
-              <a:t>Reparar um Museu</a:t>
-            </a:r>
+              <a:t>Reparar um Museu.</a:t>
+            </a:r>
+          </a:p>
+          <a:p>
+            <a:pPr lvl="1"/>
+            <a:r>
+              <a:rPr lang="pt-PT" i="0" dirty="0">
+                <a:solidFill>
+                  <a:schemeClr val="tx1"/>
+                </a:solidFill>
+              </a:rPr>
+              <a:t>Efetuar a visita de um museu como detentor de um cartão </a:t>
+            </a:r>
+            <a:r>
+              <a:rPr lang="pt-PT" dirty="0">
+                <a:solidFill>
+                  <a:schemeClr val="tx1"/>
+                </a:solidFill>
+              </a:rPr>
+              <a:t>Amigo dos Museus de Portugal</a:t>
+            </a:r>
+          </a:p>
+          <a:p>
+            <a:pPr lvl="1"/>
             <a:endParaRPr lang="pt-PT" dirty="0">
               <a:solidFill>
                 <a:schemeClr val="tx1"/>
@@ -5632,7 +5686,7 @@
                   <a:schemeClr val="tx1"/>
                 </a:solidFill>
               </a:rPr>
-              <a:t>As Empresas de Eventos e as Empresas de Reparações ambas derivam de uma classe base Empresa Base, visto partilharem bastante informação semelhante. A classe Empresa Base foi definida para este trabalho e a antiga classe Empresa de Eventos foi adaptada para derivar desta</a:t>
+              <a:t>As Empresas de Eventos e as Empresas de Reparações ambas derivam de uma classe base Empresa Base, visto partilharem bastante informação semelhante. A classe Empresa Base foi definida para este trabalho e a antiga classe Empresa de Eventos foi adaptada para derivar desta.</a:t>
             </a:r>
           </a:p>
         </p:txBody>
@@ -5751,12 +5805,12 @@
         <p:spPr>
           <a:xfrm>
             <a:off x="876628" y="1171637"/>
-            <a:ext cx="10935477" cy="1098487"/>
+            <a:ext cx="10935477" cy="1656404"/>
           </a:xfrm>
         </p:spPr>
         <p:txBody>
           <a:bodyPr>
-            <a:normAutofit lnSpcReduction="10000"/>
+            <a:normAutofit/>
           </a:bodyPr>
           <a:lstStyle/>
           <a:p>
@@ -5769,7 +5823,7 @@
                   <a:schemeClr val="tx1"/>
                 </a:solidFill>
               </a:rPr>
-              <a:t>Todas as operações de listagem e seleção de aglomerados de informação têm filtros distintos para ajudar a navegar pela grande quantidade de dados apresentados pela Rede.</a:t>
+              <a:t>Todas as operações de listagem e seleção de aglomerados de informação têm filtros distintos para ajudar a navegar pela grande quantidade de dados apresentados pela Rede. </a:t>
             </a:r>
           </a:p>
           <a:p>
@@ -6350,13 +6404,13 @@
         </p:spPr>
         <p:txBody>
           <a:bodyPr>
-            <a:normAutofit fontScale="90000"/>
+            <a:normAutofit/>
           </a:bodyPr>
           <a:lstStyle/>
           <a:p>
             <a:r>
               <a:rPr lang="pt-PT" dirty="0"/>
-              <a:t>Destaque de funcionalidade – Repair Enterprises</a:t>
+              <a:t>Funcionalidades a destacar</a:t>
             </a:r>
           </a:p>
         </p:txBody>
@@ -6407,7 +6461,7 @@
                   <a:schemeClr val="tx1"/>
                 </a:solidFill>
               </a:rPr>
-              <a:t>Foi utilizada uma stack para guardar temporariamente os elementos que não correspondem à informação pretendida</a:t>
+              <a:t>Foi utilizada uma stack para guardar temporariamente os elementos que não correspondem à informação pretendida.</a:t>
             </a:r>
           </a:p>
           <a:p>
@@ -6429,7 +6483,7 @@
                   <a:schemeClr val="tx1"/>
                 </a:solidFill>
               </a:rPr>
-              <a:t>abc:</a:t>
+              <a:t>O uso da classe auxiliar Menu, que facilitou:</a:t>
             </a:r>
           </a:p>
           <a:p>
@@ -6440,7 +6494,23 @@
                   <a:schemeClr val="tx1"/>
                 </a:solidFill>
               </a:rPr>
-              <a:t>abc</a:t>
+              <a:t>A seleção de elementos da rede (quando era necessário visitar um museu, reparar um museu, </a:t>
+            </a:r>
+            <a:r>
+              <a:rPr lang="pt-PT" i="0" dirty="0" err="1">
+                <a:solidFill>
+                  <a:schemeClr val="tx1"/>
+                </a:solidFill>
+              </a:rPr>
+              <a:t>etc</a:t>
+            </a:r>
+            <a:r>
+              <a:rPr lang="pt-PT" i="0" dirty="0">
+                <a:solidFill>
+                  <a:schemeClr val="tx1"/>
+                </a:solidFill>
+              </a:rPr>
+              <a:t> …)</a:t>
             </a:r>
           </a:p>
           <a:p>
@@ -6451,7 +6521,34 @@
                   <a:schemeClr val="tx1"/>
                 </a:solidFill>
               </a:rPr>
-              <a:t>abc</a:t>
+              <a:t>A remoção de vários elementos em simultâneo da rede</a:t>
+            </a:r>
+          </a:p>
+          <a:p>
+            <a:pPr lvl="1" algn="just"/>
+            <a:r>
+              <a:rPr lang="pt-PT" i="0" dirty="0">
+                <a:solidFill>
+                  <a:schemeClr val="tx1"/>
+                </a:solidFill>
+              </a:rPr>
+              <a:t>O uso de filtros e </a:t>
+            </a:r>
+            <a:r>
+              <a:rPr lang="pt-PT" i="0" dirty="0" err="1">
+                <a:solidFill>
+                  <a:schemeClr val="tx1"/>
+                </a:solidFill>
+              </a:rPr>
+              <a:t>sorts</a:t>
+            </a:r>
+            <a:r>
+              <a:rPr lang="pt-PT" i="0" dirty="0">
+                <a:solidFill>
+                  <a:schemeClr val="tx1"/>
+                </a:solidFill>
+              </a:rPr>
+              <a:t> na listagem de aglomerados</a:t>
             </a:r>
           </a:p>
         </p:txBody>
@@ -7177,9 +7274,12 @@
 </file>
 
 <file path=customXml/item1.xml><?xml version="1.0" encoding="utf-8"?>
-<p:properties xmlns:p="http://schemas.microsoft.com/office/2006/metadata/properties" xmlns:xsi="http://www.w3.org/2001/XMLSchema-instance" xmlns:pc="http://schemas.microsoft.com/office/infopath/2007/PartnerControls">
-  <documentManagement/>
-</p:properties>
+<?mso-contentType ?>
+<FormTemplates xmlns="http://schemas.microsoft.com/sharepoint/v3/contenttype/forms">
+  <Display>DocumentLibraryForm</Display>
+  <Edit>DocumentLibraryForm</Edit>
+  <New>DocumentLibraryForm</New>
+</FormTemplates>
 </file>
 
 <file path=customXml/item2.xml><?xml version="1.0" encoding="utf-8"?>
@@ -7353,26 +7453,15 @@
 </file>
 
 <file path=customXml/item3.xml><?xml version="1.0" encoding="utf-8"?>
-<?mso-contentType ?>
-<FormTemplates xmlns="http://schemas.microsoft.com/sharepoint/v3/contenttype/forms">
-  <Display>DocumentLibraryForm</Display>
-  <Edit>DocumentLibraryForm</Edit>
-  <New>DocumentLibraryForm</New>
-</FormTemplates>
+<p:properties xmlns:p="http://schemas.microsoft.com/office/2006/metadata/properties" xmlns:xsi="http://www.w3.org/2001/XMLSchema-instance" xmlns:pc="http://schemas.microsoft.com/office/infopath/2007/PartnerControls">
+  <documentManagement/>
+</p:properties>
 </file>
 
 <file path=customXml/itemProps1.xml><?xml version="1.0" encoding="utf-8"?>
-<ds:datastoreItem xmlns:ds="http://schemas.openxmlformats.org/officeDocument/2006/customXml" ds:itemID="{C31DC4EE-CE8D-44D1-B01D-8FBB19F3B6D4}">
+<ds:datastoreItem xmlns:ds="http://schemas.openxmlformats.org/officeDocument/2006/customXml" ds:itemID="{7680A571-770C-406E-943B-80D479BFC2E3}">
   <ds:schemaRefs>
-    <ds:schemaRef ds:uri="http://purl.org/dc/dcmitype/"/>
-    <ds:schemaRef ds:uri="http://schemas.openxmlformats.org/package/2006/metadata/core-properties"/>
-    <ds:schemaRef ds:uri="http://purl.org/dc/elements/1.1/"/>
-    <ds:schemaRef ds:uri="http://purl.org/dc/terms/"/>
-    <ds:schemaRef ds:uri="http://schemas.microsoft.com/office/infopath/2007/PartnerControls"/>
-    <ds:schemaRef ds:uri="http://schemas.microsoft.com/office/2006/metadata/properties"/>
-    <ds:schemaRef ds:uri="http://schemas.microsoft.com/office/2006/documentManagement/types"/>
-    <ds:schemaRef ds:uri="6ce73d69-b8d4-4b83-a6ca-cd828de064d5"/>
-    <ds:schemaRef ds:uri="http://www.w3.org/XML/1998/namespace"/>
+    <ds:schemaRef ds:uri="http://schemas.microsoft.com/sharepoint/v3/contenttype/forms"/>
   </ds:schemaRefs>
 </ds:datastoreItem>
 </file>
@@ -7396,9 +7485,17 @@
 </file>
 
 <file path=customXml/itemProps3.xml><?xml version="1.0" encoding="utf-8"?>
-<ds:datastoreItem xmlns:ds="http://schemas.openxmlformats.org/officeDocument/2006/customXml" ds:itemID="{7680A571-770C-406E-943B-80D479BFC2E3}">
+<ds:datastoreItem xmlns:ds="http://schemas.openxmlformats.org/officeDocument/2006/customXml" ds:itemID="{C31DC4EE-CE8D-44D1-B01D-8FBB19F3B6D4}">
   <ds:schemaRefs>
-    <ds:schemaRef ds:uri="http://schemas.microsoft.com/sharepoint/v3/contenttype/forms"/>
+    <ds:schemaRef ds:uri="http://purl.org/dc/dcmitype/"/>
+    <ds:schemaRef ds:uri="http://schemas.openxmlformats.org/package/2006/metadata/core-properties"/>
+    <ds:schemaRef ds:uri="http://purl.org/dc/elements/1.1/"/>
+    <ds:schemaRef ds:uri="http://purl.org/dc/terms/"/>
+    <ds:schemaRef ds:uri="http://schemas.microsoft.com/office/infopath/2007/PartnerControls"/>
+    <ds:schemaRef ds:uri="http://schemas.microsoft.com/office/2006/metadata/properties"/>
+    <ds:schemaRef ds:uri="http://schemas.microsoft.com/office/2006/documentManagement/types"/>
+    <ds:schemaRef ds:uri="6ce73d69-b8d4-4b83-a6ca-cd828de064d5"/>
+    <ds:schemaRef ds:uri="http://www.w3.org/XML/1998/namespace"/>
   </ds:schemaRefs>
 </ds:datastoreItem>
 </file>
</xml_diff>

<commit_message>
Added worker exporting image
</commit_message>
<xml_diff>
--- a/AEDA_-_Cartao_Museus_de_Portugal_parte_2.pptx
+++ b/AEDA_-_Cartao_Museus_de_Portugal_parte_2.pptx
@@ -206,7 +206,7 @@
           <a:p>
             <a:fld id="{34BD70C7-4E8C-4886-A885-5C4875E9B61A}" type="datetimeFigureOut">
               <a:rPr lang="pt-PT" smtClean="0"/>
-              <a:t>02/01/2020</a:t>
+              <a:t>03/01/2020</a:t>
             </a:fld>
             <a:endParaRPr lang="pt-PT"/>
           </a:p>
@@ -896,7 +896,7 @@
             <a:fld id="{87DE6118-2437-4B30-8E3C-4D2BE6020583}" type="datetimeFigureOut">
               <a:rPr lang="en-US" smtClean="0"/>
               <a:pPr/>
-              <a:t>1/2/2020</a:t>
+              <a:t>1/3/2020</a:t>
             </a:fld>
             <a:endParaRPr lang="en-US" dirty="0"/>
           </a:p>
@@ -1228,7 +1228,7 @@
             <a:fld id="{87DE6118-2437-4B30-8E3C-4D2BE6020583}" type="datetimeFigureOut">
               <a:rPr lang="en-US" smtClean="0"/>
               <a:pPr/>
-              <a:t>1/2/2020</a:t>
+              <a:t>1/3/2020</a:t>
             </a:fld>
             <a:endParaRPr lang="en-US" dirty="0"/>
           </a:p>
@@ -1410,7 +1410,7 @@
             <a:fld id="{87DE6118-2437-4B30-8E3C-4D2BE6020583}" type="datetimeFigureOut">
               <a:rPr lang="en-US" smtClean="0"/>
               <a:pPr/>
-              <a:t>1/2/2020</a:t>
+              <a:t>1/3/2020</a:t>
             </a:fld>
             <a:endParaRPr lang="en-US" dirty="0"/>
           </a:p>
@@ -1582,7 +1582,7 @@
             <a:fld id="{87DE6118-2437-4B30-8E3C-4D2BE6020583}" type="datetimeFigureOut">
               <a:rPr lang="en-US" smtClean="0"/>
               <a:pPr/>
-              <a:t>1/2/2020</a:t>
+              <a:t>1/3/2020</a:t>
             </a:fld>
             <a:endParaRPr lang="en-US" dirty="0"/>
           </a:p>
@@ -1861,7 +1861,7 @@
             <a:fld id="{87DE6118-2437-4B30-8E3C-4D2BE6020583}" type="datetimeFigureOut">
               <a:rPr lang="en-US" smtClean="0"/>
               <a:pPr/>
-              <a:t>1/2/2020</a:t>
+              <a:t>1/3/2020</a:t>
             </a:fld>
             <a:endParaRPr lang="en-US" dirty="0"/>
           </a:p>
@@ -2257,7 +2257,7 @@
             <a:fld id="{87DE6118-2437-4B30-8E3C-4D2BE6020583}" type="datetimeFigureOut">
               <a:rPr lang="en-US" smtClean="0"/>
               <a:pPr/>
-              <a:t>1/2/2020</a:t>
+              <a:t>1/3/2020</a:t>
             </a:fld>
             <a:endParaRPr lang="en-US" dirty="0"/>
           </a:p>
@@ -2736,7 +2736,7 @@
             <a:fld id="{87DE6118-2437-4B30-8E3C-4D2BE6020583}" type="datetimeFigureOut">
               <a:rPr lang="en-US" smtClean="0"/>
               <a:pPr/>
-              <a:t>1/2/2020</a:t>
+              <a:t>1/3/2020</a:t>
             </a:fld>
             <a:endParaRPr lang="en-US" dirty="0"/>
           </a:p>
@@ -2856,7 +2856,7 @@
             <a:fld id="{87DE6118-2437-4B30-8E3C-4D2BE6020583}" type="datetimeFigureOut">
               <a:rPr lang="en-US" smtClean="0"/>
               <a:pPr/>
-              <a:t>1/2/2020</a:t>
+              <a:t>1/3/2020</a:t>
             </a:fld>
             <a:endParaRPr lang="en-US" dirty="0"/>
           </a:p>
@@ -2953,7 +2953,7 @@
             <a:fld id="{87DE6118-2437-4B30-8E3C-4D2BE6020583}" type="datetimeFigureOut">
               <a:rPr lang="en-US" smtClean="0"/>
               <a:pPr/>
-              <a:t>1/2/2020</a:t>
+              <a:t>1/3/2020</a:t>
             </a:fld>
             <a:endParaRPr lang="en-US" dirty="0"/>
           </a:p>
@@ -3301,7 +3301,7 @@
             <a:fld id="{87DE6118-2437-4B30-8E3C-4D2BE6020583}" type="datetimeFigureOut">
               <a:rPr lang="en-US" smtClean="0"/>
               <a:pPr/>
-              <a:t>1/2/2020</a:t>
+              <a:t>1/3/2020</a:t>
             </a:fld>
             <a:endParaRPr lang="en-US" dirty="0"/>
           </a:p>
@@ -3690,7 +3690,7 @@
             <a:fld id="{87DE6118-2437-4B30-8E3C-4D2BE6020583}" type="datetimeFigureOut">
               <a:rPr lang="en-US" smtClean="0"/>
               <a:pPr/>
-              <a:t>1/2/2020</a:t>
+              <a:t>1/3/2020</a:t>
             </a:fld>
             <a:endParaRPr lang="en-US" dirty="0"/>
           </a:p>
@@ -3970,7 +3970,7 @@
             <a:fld id="{87DE6118-2437-4B30-8E3C-4D2BE6020583}" type="datetimeFigureOut">
               <a:rPr lang="en-US" smtClean="0"/>
               <a:pPr/>
-              <a:t>1/2/2020</a:t>
+              <a:t>1/3/2020</a:t>
             </a:fld>
             <a:endParaRPr lang="en-US" dirty="0"/>
           </a:p>
@@ -5382,7 +5382,7 @@
         <p:spPr>
           <a:xfrm>
             <a:off x="725648" y="2419126"/>
-            <a:ext cx="6059828" cy="1208729"/>
+            <a:ext cx="6059828" cy="1593450"/>
           </a:xfrm>
           <a:prstGeom prst="rect">
             <a:avLst/>
@@ -5395,10 +5395,12 @@
           </a:bodyPr>
           <a:lstStyle/>
           <a:p>
-            <a:pPr algn="just">
+            <a:pPr marL="342900" indent="-342900" algn="just">
               <a:lnSpc>
                 <a:spcPct val="125000"/>
               </a:lnSpc>
+              <a:buFont typeface="Wingdings" panose="05000000000000000000" pitchFamily="2" charset="2"/>
+              <a:buChar char="§"/>
             </a:pPr>
             <a:r>
               <a:rPr lang="pt-PT" sz="2000" dirty="0"/>
@@ -5421,7 +5423,7 @@
         </p:nvSpPr>
         <p:spPr>
           <a:xfrm>
-            <a:off x="7200902" y="6216294"/>
+            <a:off x="7200902" y="5064843"/>
             <a:ext cx="4627653" cy="461665"/>
           </a:xfrm>
           <a:prstGeom prst="rect">
@@ -5470,10 +5472,12 @@
           </a:bodyPr>
           <a:lstStyle/>
           <a:p>
-            <a:pPr algn="just">
+            <a:pPr marL="342900" indent="-342900" algn="just">
               <a:lnSpc>
                 <a:spcPct val="125000"/>
               </a:lnSpc>
+              <a:buFont typeface="Wingdings" panose="05000000000000000000" pitchFamily="2" charset="2"/>
+              <a:buChar char="§"/>
             </a:pPr>
             <a:r>
               <a:rPr lang="pt-PT" sz="2000" dirty="0"/>
@@ -5490,6 +5494,36 @@
           </a:p>
         </p:txBody>
       </p:sp>
+      <p:pic>
+        <p:nvPicPr>
+          <p:cNvPr id="4" name="Imagem 3">
+            <a:extLst>
+              <a:ext uri="{FF2B5EF4-FFF2-40B4-BE49-F238E27FC236}">
+                <a16:creationId xmlns:a16="http://schemas.microsoft.com/office/drawing/2014/main" id="{EC1E9C63-57DA-43DF-B8CB-D666A9D58F1D}"/>
+              </a:ext>
+            </a:extLst>
+          </p:cNvPr>
+          <p:cNvPicPr>
+            <a:picLocks noChangeAspect="1"/>
+          </p:cNvPicPr>
+          <p:nvPr/>
+        </p:nvPicPr>
+        <p:blipFill>
+          <a:blip r:embed="rId4"/>
+          <a:stretch>
+            <a:fillRect/>
+          </a:stretch>
+        </p:blipFill>
+        <p:spPr>
+          <a:xfrm>
+            <a:off x="7200902" y="3059336"/>
+            <a:ext cx="4846640" cy="1851912"/>
+          </a:xfrm>
+          <a:prstGeom prst="rect">
+            <a:avLst/>
+          </a:prstGeom>
+        </p:spPr>
+      </p:pic>
     </p:spTree>
     <p:extLst>
       <p:ext uri="{BB962C8B-B14F-4D97-AF65-F5344CB8AC3E}">
@@ -7274,12 +7308,9 @@
 </file>
 
 <file path=customXml/item1.xml><?xml version="1.0" encoding="utf-8"?>
-<?mso-contentType ?>
-<FormTemplates xmlns="http://schemas.microsoft.com/sharepoint/v3/contenttype/forms">
-  <Display>DocumentLibraryForm</Display>
-  <Edit>DocumentLibraryForm</Edit>
-  <New>DocumentLibraryForm</New>
-</FormTemplates>
+<p:properties xmlns:p="http://schemas.microsoft.com/office/2006/metadata/properties" xmlns:xsi="http://www.w3.org/2001/XMLSchema-instance" xmlns:pc="http://schemas.microsoft.com/office/infopath/2007/PartnerControls">
+  <documentManagement/>
+</p:properties>
 </file>
 
 <file path=customXml/item2.xml><?xml version="1.0" encoding="utf-8"?>
@@ -7453,15 +7484,26 @@
 </file>
 
 <file path=customXml/item3.xml><?xml version="1.0" encoding="utf-8"?>
-<p:properties xmlns:p="http://schemas.microsoft.com/office/2006/metadata/properties" xmlns:xsi="http://www.w3.org/2001/XMLSchema-instance" xmlns:pc="http://schemas.microsoft.com/office/infopath/2007/PartnerControls">
-  <documentManagement/>
-</p:properties>
+<?mso-contentType ?>
+<FormTemplates xmlns="http://schemas.microsoft.com/sharepoint/v3/contenttype/forms">
+  <Display>DocumentLibraryForm</Display>
+  <Edit>DocumentLibraryForm</Edit>
+  <New>DocumentLibraryForm</New>
+</FormTemplates>
 </file>
 
 <file path=customXml/itemProps1.xml><?xml version="1.0" encoding="utf-8"?>
-<ds:datastoreItem xmlns:ds="http://schemas.openxmlformats.org/officeDocument/2006/customXml" ds:itemID="{7680A571-770C-406E-943B-80D479BFC2E3}">
+<ds:datastoreItem xmlns:ds="http://schemas.openxmlformats.org/officeDocument/2006/customXml" ds:itemID="{C31DC4EE-CE8D-44D1-B01D-8FBB19F3B6D4}">
   <ds:schemaRefs>
-    <ds:schemaRef ds:uri="http://schemas.microsoft.com/sharepoint/v3/contenttype/forms"/>
+    <ds:schemaRef ds:uri="http://purl.org/dc/dcmitype/"/>
+    <ds:schemaRef ds:uri="http://schemas.openxmlformats.org/package/2006/metadata/core-properties"/>
+    <ds:schemaRef ds:uri="http://purl.org/dc/elements/1.1/"/>
+    <ds:schemaRef ds:uri="http://purl.org/dc/terms/"/>
+    <ds:schemaRef ds:uri="http://schemas.microsoft.com/office/infopath/2007/PartnerControls"/>
+    <ds:schemaRef ds:uri="http://schemas.microsoft.com/office/2006/metadata/properties"/>
+    <ds:schemaRef ds:uri="http://schemas.microsoft.com/office/2006/documentManagement/types"/>
+    <ds:schemaRef ds:uri="6ce73d69-b8d4-4b83-a6ca-cd828de064d5"/>
+    <ds:schemaRef ds:uri="http://www.w3.org/XML/1998/namespace"/>
   </ds:schemaRefs>
 </ds:datastoreItem>
 </file>
@@ -7485,17 +7527,9 @@
 </file>
 
 <file path=customXml/itemProps3.xml><?xml version="1.0" encoding="utf-8"?>
-<ds:datastoreItem xmlns:ds="http://schemas.openxmlformats.org/officeDocument/2006/customXml" ds:itemID="{C31DC4EE-CE8D-44D1-B01D-8FBB19F3B6D4}">
+<ds:datastoreItem xmlns:ds="http://schemas.openxmlformats.org/officeDocument/2006/customXml" ds:itemID="{7680A571-770C-406E-943B-80D479BFC2E3}">
   <ds:schemaRefs>
-    <ds:schemaRef ds:uri="http://purl.org/dc/dcmitype/"/>
-    <ds:schemaRef ds:uri="http://schemas.openxmlformats.org/package/2006/metadata/core-properties"/>
-    <ds:schemaRef ds:uri="http://purl.org/dc/elements/1.1/"/>
-    <ds:schemaRef ds:uri="http://purl.org/dc/terms/"/>
-    <ds:schemaRef ds:uri="http://schemas.microsoft.com/office/infopath/2007/PartnerControls"/>
-    <ds:schemaRef ds:uri="http://schemas.microsoft.com/office/2006/metadata/properties"/>
-    <ds:schemaRef ds:uri="http://schemas.microsoft.com/office/2006/documentManagement/types"/>
-    <ds:schemaRef ds:uri="6ce73d69-b8d4-4b83-a6ca-cd828de064d5"/>
-    <ds:schemaRef ds:uri="http://www.w3.org/XML/1998/namespace"/>
+    <ds:schemaRef ds:uri="http://schemas.microsoft.com/sharepoint/v3/contenttype/forms"/>
   </ds:schemaRefs>
 </ds:datastoreItem>
 </file>
</xml_diff>

<commit_message>
Fixed power point formatting, typos and some rephrasing
</commit_message>
<xml_diff>
--- a/AEDA_-_Cartao_Museus_de_Portugal_parte_2.pptx
+++ b/AEDA_-_Cartao_Museus_de_Portugal_parte_2.pptx
@@ -5101,12 +5101,17 @@
         </p:spPr>
         <p:txBody>
           <a:bodyPr>
-            <a:normAutofit lnSpcReduction="10000"/>
+            <a:normAutofit/>
           </a:bodyPr>
           <a:lstStyle/>
           <a:p>
-            <a:r>
-              <a:rPr lang="pt-PT" dirty="0">
+            <a:pPr>
+              <a:lnSpc>
+                <a:spcPct val="120000"/>
+              </a:lnSpc>
+            </a:pPr>
+            <a:r>
+              <a:rPr lang="pt-PT" sz="1800" dirty="0">
                 <a:solidFill>
                   <a:schemeClr val="tx1"/>
                 </a:solidFill>
@@ -5115,9 +5120,13 @@
             </a:r>
           </a:p>
           <a:p>
-            <a:pPr lvl="1"/>
-            <a:r>
-              <a:rPr lang="pt-PT" sz="1800" i="0" dirty="0">
+            <a:pPr lvl="1">
+              <a:lnSpc>
+                <a:spcPct val="120000"/>
+              </a:lnSpc>
+            </a:pPr>
+            <a:r>
+              <a:rPr lang="pt-PT" sz="1400" i="0" dirty="0">
                 <a:solidFill>
                   <a:schemeClr val="tx1"/>
                 </a:solidFill>
@@ -5125,7 +5134,7 @@
               <a:t>Tal como pedido, os Museus numa BST (std::set), as Empresas de Reparação numa priority queue (std::priority_queue) e os Trabalhadores do estado numa </a:t>
             </a:r>
             <a:r>
-              <a:rPr lang="pt-PT" sz="1800" i="0" dirty="0" err="1">
+              <a:rPr lang="pt-PT" sz="1400" i="0" dirty="0" err="1">
                 <a:solidFill>
                   <a:schemeClr val="tx1"/>
                 </a:solidFill>
@@ -5133,7 +5142,7 @@
               <a:t>hashtable</a:t>
             </a:r>
             <a:r>
-              <a:rPr lang="pt-PT" sz="1800" i="0" dirty="0">
+              <a:rPr lang="pt-PT" sz="1400" i="0" dirty="0">
                 <a:solidFill>
                   <a:schemeClr val="tx1"/>
                 </a:solidFill>
@@ -5141,7 +5150,7 @@
               <a:t> (std::</a:t>
             </a:r>
             <a:r>
-              <a:rPr lang="pt-PT" sz="1800" i="0" dirty="0" err="1">
+              <a:rPr lang="pt-PT" sz="1400" i="0" dirty="0" err="1">
                 <a:solidFill>
                   <a:schemeClr val="tx1"/>
                 </a:solidFill>
@@ -5149,7 +5158,7 @@
               <a:t>unordered_set</a:t>
             </a:r>
             <a:r>
-              <a:rPr lang="pt-PT" sz="1800" i="0" dirty="0">
+              <a:rPr lang="pt-PT" sz="1400" i="0" dirty="0">
                 <a:solidFill>
                   <a:schemeClr val="tx1"/>
                 </a:solidFill>
@@ -5158,15 +5167,24 @@
             </a:r>
           </a:p>
           <a:p>
-            <a:r>
-              <a:rPr lang="pt-PT" dirty="0"/>
+            <a:pPr>
+              <a:lnSpc>
+                <a:spcPct val="120000"/>
+              </a:lnSpc>
+            </a:pPr>
+            <a:r>
+              <a:rPr lang="pt-PT" sz="1800" dirty="0"/>
               <a:t>Soluções práticas:</a:t>
             </a:r>
           </a:p>
           <a:p>
-            <a:pPr lvl="1"/>
-            <a:r>
-              <a:rPr lang="pt-PT" sz="1800" i="0" dirty="0">
+            <a:pPr lvl="1">
+              <a:lnSpc>
+                <a:spcPct val="120000"/>
+              </a:lnSpc>
+            </a:pPr>
+            <a:r>
+              <a:rPr lang="pt-PT" sz="1400" i="0" dirty="0">
                 <a:solidFill>
                   <a:schemeClr val="tx1"/>
                 </a:solidFill>
@@ -5175,9 +5193,13 @@
             </a:r>
           </a:p>
           <a:p>
-            <a:pPr lvl="1"/>
-            <a:r>
-              <a:rPr lang="pt-PT" sz="1800" i="0" dirty="0">
+            <a:pPr lvl="1">
+              <a:lnSpc>
+                <a:spcPct val="120000"/>
+              </a:lnSpc>
+            </a:pPr>
+            <a:r>
+              <a:rPr lang="pt-PT" sz="1400" i="0" dirty="0">
                 <a:solidFill>
                   <a:schemeClr val="tx1"/>
                 </a:solidFill>
@@ -5186,8 +5208,13 @@
             </a:r>
           </a:p>
           <a:p>
-            <a:r>
-              <a:rPr lang="pt-PT" dirty="0">
+            <a:pPr>
+              <a:lnSpc>
+                <a:spcPct val="120000"/>
+              </a:lnSpc>
+            </a:pPr>
+            <a:r>
+              <a:rPr lang="pt-PT" sz="1800" dirty="0">
                 <a:solidFill>
                   <a:schemeClr val="tx1"/>
                 </a:solidFill>
@@ -5196,9 +5223,13 @@
             </a:r>
           </a:p>
           <a:p>
-            <a:pPr lvl="1"/>
-            <a:r>
-              <a:rPr lang="pt-PT" sz="1800" i="0" dirty="0">
+            <a:pPr lvl="1">
+              <a:lnSpc>
+                <a:spcPct val="120000"/>
+              </a:lnSpc>
+            </a:pPr>
+            <a:r>
+              <a:rPr lang="pt-PT" sz="1400" i="0" dirty="0">
                 <a:solidFill>
                   <a:schemeClr val="tx1"/>
                 </a:solidFill>
@@ -5207,9 +5238,13 @@
             </a:r>
           </a:p>
           <a:p>
-            <a:pPr lvl="1"/>
-            <a:r>
-              <a:rPr lang="pt-PT" sz="1800" i="0" dirty="0">
+            <a:pPr lvl="1">
+              <a:lnSpc>
+                <a:spcPct val="120000"/>
+              </a:lnSpc>
+            </a:pPr>
+            <a:r>
+              <a:rPr lang="pt-PT" sz="1400" i="0" dirty="0">
                 <a:solidFill>
                   <a:schemeClr val="tx1"/>
                 </a:solidFill>
@@ -5346,18 +5381,18 @@
         </p:spPr>
         <p:txBody>
           <a:bodyPr>
-            <a:normAutofit fontScale="92500"/>
+            <a:normAutofit/>
           </a:bodyPr>
           <a:lstStyle/>
           <a:p>
             <a:pPr marL="0" indent="0" algn="just">
               <a:lnSpc>
-                <a:spcPct val="125000"/>
+                <a:spcPct val="150000"/>
               </a:lnSpc>
               <a:buNone/>
             </a:pPr>
             <a:r>
-              <a:rPr lang="pt-PT" dirty="0">
+              <a:rPr lang="pt-PT" sz="1800" dirty="0">
                 <a:solidFill>
                   <a:schemeClr val="tx1"/>
                 </a:solidFill>
@@ -5381,8 +5416,8 @@
         </p:nvSpPr>
         <p:spPr>
           <a:xfrm>
-            <a:off x="725648" y="2419126"/>
-            <a:ext cx="6059828" cy="1593450"/>
+            <a:off x="484348" y="2419126"/>
+            <a:ext cx="6059829" cy="1097095"/>
           </a:xfrm>
           <a:prstGeom prst="rect">
             <a:avLst/>
@@ -5403,7 +5438,7 @@
               <a:buChar char="§"/>
             </a:pPr>
             <a:r>
-              <a:rPr lang="pt-PT" sz="2000" dirty="0"/>
+              <a:rPr lang="pt-PT" dirty="0"/>
               <a:t>O ficheiro dos Trabalhadores do Estado consiste num número identificando a quantidade de Trabalhadores a ler seguido pela informação deles.</a:t>
             </a:r>
           </a:p>
@@ -5423,8 +5458,8 @@
         </p:nvSpPr>
         <p:spPr>
           <a:xfrm>
-            <a:off x="7200902" y="5064843"/>
-            <a:ext cx="4627653" cy="461665"/>
+            <a:off x="6684893" y="5064843"/>
+            <a:ext cx="5177069" cy="523220"/>
           </a:xfrm>
           <a:prstGeom prst="rect">
             <a:avLst/>
@@ -5437,8 +5472,9 @@
           </a:bodyPr>
           <a:lstStyle/>
           <a:p>
-            <a:r>
-              <a:rPr lang="pt-PT" sz="1200" dirty="0"/>
+            <a:pPr algn="ctr"/>
+            <a:r>
+              <a:rPr lang="pt-PT" sz="1400" dirty="0"/>
               <a:t>e.g. do conteúdo de um ficheiro de informação de Trabalhadores do Estado</a:t>
             </a:r>
           </a:p>
@@ -5458,8 +5494,8 @@
         </p:nvSpPr>
         <p:spPr>
           <a:xfrm>
-            <a:off x="725648" y="4131359"/>
-            <a:ext cx="6059828" cy="1978170"/>
+            <a:off x="484348" y="4131359"/>
+            <a:ext cx="6059829" cy="1443344"/>
           </a:xfrm>
           <a:prstGeom prst="rect">
             <a:avLst/>
@@ -5480,15 +5516,15 @@
               <a:buChar char="§"/>
             </a:pPr>
             <a:r>
-              <a:rPr lang="pt-PT" sz="2000" dirty="0"/>
+              <a:rPr lang="pt-PT" dirty="0"/>
               <a:t>Cada Trabalhador guarda o seu nome, cc, contacto, </a:t>
             </a:r>
             <a:r>
-              <a:rPr lang="pt-PT" sz="2000" i="1" dirty="0"/>
+              <a:rPr lang="pt-PT" i="1" dirty="0"/>
               <a:t>address</a:t>
             </a:r>
             <a:r>
-              <a:rPr lang="pt-PT" sz="2000" dirty="0"/>
+              <a:rPr lang="pt-PT" dirty="0"/>
               <a:t>, data de nascimento, 1 se estiver empregue (0 caso contrário), seguido do nome e coordenadas do Museu que o emprega (caso esteja empregue). </a:t>
             </a:r>
           </a:p>
@@ -5516,8 +5552,8 @@
         </p:blipFill>
         <p:spPr>
           <a:xfrm>
-            <a:off x="7200902" y="3059336"/>
-            <a:ext cx="4846640" cy="1851912"/>
+            <a:off x="6684893" y="3023491"/>
+            <a:ext cx="5177070" cy="1978170"/>
           </a:xfrm>
           <a:prstGeom prst="rect">
             <a:avLst/>
@@ -5645,8 +5681,13 @@
           </a:bodyPr>
           <a:lstStyle/>
           <a:p>
-            <a:r>
-              <a:rPr lang="pt-PT" dirty="0">
+            <a:pPr>
+              <a:lnSpc>
+                <a:spcPct val="150000"/>
+              </a:lnSpc>
+            </a:pPr>
+            <a:r>
+              <a:rPr lang="pt-PT" sz="1800" dirty="0">
                 <a:solidFill>
                   <a:schemeClr val="tx1"/>
                 </a:solidFill>
@@ -5655,8 +5696,25 @@
             </a:r>
           </a:p>
           <a:p>
-            <a:r>
-              <a:rPr lang="pt-PT" dirty="0">
+            <a:pPr>
+              <a:lnSpc>
+                <a:spcPct val="150000"/>
+              </a:lnSpc>
+            </a:pPr>
+            <a:endParaRPr lang="pt-PT" sz="1800" dirty="0">
+              <a:solidFill>
+                <a:schemeClr val="tx1"/>
+              </a:solidFill>
+            </a:endParaRPr>
+          </a:p>
+          <a:p>
+            <a:pPr>
+              <a:lnSpc>
+                <a:spcPct val="150000"/>
+              </a:lnSpc>
+            </a:pPr>
+            <a:r>
+              <a:rPr lang="pt-PT" sz="1800" dirty="0">
                 <a:solidFill>
                   <a:schemeClr val="tx1"/>
                 </a:solidFill>
@@ -5665,9 +5723,13 @@
             </a:r>
           </a:p>
           <a:p>
-            <a:pPr lvl="1"/>
-            <a:r>
-              <a:rPr lang="pt-PT" i="0" dirty="0">
+            <a:pPr lvl="1">
+              <a:lnSpc>
+                <a:spcPct val="150000"/>
+              </a:lnSpc>
+            </a:pPr>
+            <a:r>
+              <a:rPr lang="pt-PT" sz="1800" i="0" dirty="0">
                 <a:solidFill>
                   <a:schemeClr val="tx1"/>
                 </a:solidFill>
@@ -5676,9 +5738,13 @@
             </a:r>
           </a:p>
           <a:p>
-            <a:pPr lvl="1"/>
-            <a:r>
-              <a:rPr lang="pt-PT" i="0" dirty="0">
+            <a:pPr lvl="1">
+              <a:lnSpc>
+                <a:spcPct val="150000"/>
+              </a:lnSpc>
+            </a:pPr>
+            <a:r>
+              <a:rPr lang="pt-PT" sz="1800" i="0" dirty="0">
                 <a:solidFill>
                   <a:schemeClr val="tx1"/>
                 </a:solidFill>
@@ -5687,9 +5753,13 @@
             </a:r>
           </a:p>
           <a:p>
-            <a:pPr lvl="1"/>
-            <a:r>
-              <a:rPr lang="pt-PT" i="0" dirty="0">
+            <a:pPr lvl="1">
+              <a:lnSpc>
+                <a:spcPct val="150000"/>
+              </a:lnSpc>
+            </a:pPr>
+            <a:r>
+              <a:rPr lang="pt-PT" sz="1800" i="0" dirty="0">
                 <a:solidFill>
                   <a:schemeClr val="tx1"/>
                 </a:solidFill>
@@ -5697,7 +5767,7 @@
               <a:t>Efetuar a visita de um museu como detentor de um cartão </a:t>
             </a:r>
             <a:r>
-              <a:rPr lang="pt-PT" dirty="0">
+              <a:rPr lang="pt-PT" sz="1800" dirty="0">
                 <a:solidFill>
                   <a:schemeClr val="tx1"/>
                 </a:solidFill>
@@ -5712,16 +5782,6 @@
                 <a:schemeClr val="tx1"/>
               </a:solidFill>
             </a:endParaRPr>
-          </a:p>
-          <a:p>
-            <a:r>
-              <a:rPr lang="pt-PT" i="0" dirty="0">
-                <a:solidFill>
-                  <a:schemeClr val="tx1"/>
-                </a:solidFill>
-              </a:rPr>
-              <a:t>As Empresas de Eventos e as Empresas de Reparações ambas derivam de uma classe base Empresa Base, visto partilharem bastante informação semelhante. A classe Empresa Base foi definida para este trabalho e a antiga classe Empresa de Eventos foi adaptada para derivar desta.</a:t>
-            </a:r>
           </a:p>
         </p:txBody>
       </p:sp>
@@ -5822,68 +5882,6 @@
       </p:sp>
       <p:sp>
         <p:nvSpPr>
-          <p:cNvPr id="3" name="Marcador de Posição de Conteúdo 2">
-            <a:extLst>
-              <a:ext uri="{FF2B5EF4-FFF2-40B4-BE49-F238E27FC236}">
-                <a16:creationId xmlns:a16="http://schemas.microsoft.com/office/drawing/2014/main" id="{5F0A40F0-64D0-474E-A342-7D09549A7DCC}"/>
-              </a:ext>
-            </a:extLst>
-          </p:cNvPr>
-          <p:cNvSpPr>
-            <a:spLocks noGrp="1"/>
-          </p:cNvSpPr>
-          <p:nvPr>
-            <p:ph idx="1"/>
-          </p:nvPr>
-        </p:nvSpPr>
-        <p:spPr>
-          <a:xfrm>
-            <a:off x="876628" y="1171637"/>
-            <a:ext cx="10935477" cy="1656404"/>
-          </a:xfrm>
-        </p:spPr>
-        <p:txBody>
-          <a:bodyPr>
-            <a:normAutofit/>
-          </a:bodyPr>
-          <a:lstStyle/>
-          <a:p>
-            <a:pPr marL="0" indent="0">
-              <a:buNone/>
-            </a:pPr>
-            <a:r>
-              <a:rPr lang="pt-PT" dirty="0">
-                <a:solidFill>
-                  <a:schemeClr val="tx1"/>
-                </a:solidFill>
-              </a:rPr>
-              <a:t>Todas as operações de listagem e seleção de aglomerados de informação têm filtros distintos para ajudar a navegar pela grande quantidade de dados apresentados pela Rede. </a:t>
-            </a:r>
-          </a:p>
-          <a:p>
-            <a:pPr marL="0" indent="0">
-              <a:buNone/>
-            </a:pPr>
-            <a:r>
-              <a:rPr lang="pt-PT" dirty="0">
-                <a:solidFill>
-                  <a:schemeClr val="tx1"/>
-                </a:solidFill>
-              </a:rPr>
-              <a:t>A acrescentar aos já presentes no trabalho anterior, destacam-se:</a:t>
-            </a:r>
-          </a:p>
-          <a:p>
-            <a:endParaRPr lang="pt-PT" i="0" dirty="0">
-              <a:solidFill>
-                <a:schemeClr val="tx1"/>
-              </a:solidFill>
-            </a:endParaRPr>
-          </a:p>
-        </p:txBody>
-      </p:sp>
-      <p:sp>
-        <p:nvSpPr>
           <p:cNvPr id="6" name="TextBox 5">
             <a:extLst>
               <a:ext uri="{FF2B5EF4-FFF2-40B4-BE49-F238E27FC236}">
@@ -5896,8 +5894,8 @@
         </p:nvSpPr>
         <p:spPr>
           <a:xfrm>
-            <a:off x="3799899" y="3111131"/>
-            <a:ext cx="4592201" cy="1754326"/>
+            <a:off x="6297177" y="4699000"/>
+            <a:ext cx="6305635" cy="923330"/>
           </a:xfrm>
           <a:prstGeom prst="rect">
             <a:avLst/>
@@ -5916,7 +5914,7 @@
             </a:pPr>
             <a:r>
               <a:rPr lang="pt-PT" b="1" dirty="0"/>
-              <a:t>Filtro de Repair Enterprises:</a:t>
+              <a:t>Filtro de Trabalhadores do Estado</a:t>
             </a:r>
           </a:p>
           <a:p>
@@ -5926,7 +5924,7 @@
             </a:pPr>
             <a:r>
               <a:rPr lang="pt-PT" dirty="0"/>
-              <a:t>Por Endereço</a:t>
+              <a:t>Por Estado de Empregação</a:t>
             </a:r>
           </a:p>
           <a:p>
@@ -5938,7 +5936,37 @@
               <a:rPr lang="pt-PT" dirty="0"/>
               <a:t>Por Nome</a:t>
             </a:r>
-          </a:p>
+            <a:endParaRPr lang="pt-PT" b="1" dirty="0"/>
+          </a:p>
+        </p:txBody>
+      </p:sp>
+      <p:sp>
+        <p:nvSpPr>
+          <p:cNvPr id="5" name="CaixaDeTexto 4">
+            <a:extLst>
+              <a:ext uri="{FF2B5EF4-FFF2-40B4-BE49-F238E27FC236}">
+                <a16:creationId xmlns:a16="http://schemas.microsoft.com/office/drawing/2014/main" id="{8EC32618-8B68-4577-B07A-1CC260EEEA9E}"/>
+              </a:ext>
+            </a:extLst>
+          </p:cNvPr>
+          <p:cNvSpPr txBox="1"/>
+          <p:nvPr/>
+        </p:nvSpPr>
+        <p:spPr>
+          <a:xfrm>
+            <a:off x="876628" y="4699000"/>
+            <a:ext cx="4355183" cy="1201919"/>
+          </a:xfrm>
+          <a:prstGeom prst="rect">
+            <a:avLst/>
+          </a:prstGeom>
+          <a:noFill/>
+        </p:spPr>
+        <p:txBody>
+          <a:bodyPr wrap="square" rtlCol="0">
+            <a:spAutoFit/>
+          </a:bodyPr>
+          <a:lstStyle/>
           <a:p>
             <a:pPr marL="285750" indent="-285750">
               <a:buFont typeface="Wingdings" panose="05000000000000000000" pitchFamily="2" charset="2"/>
@@ -5946,7 +5974,23 @@
             </a:pPr>
             <a:r>
               <a:rPr lang="pt-PT" b="1" dirty="0"/>
-              <a:t>Filtro de Trabalhadores do Estado</a:t>
+              <a:t>Filtro de </a:t>
+            </a:r>
+            <a:r>
+              <a:rPr lang="pt-PT" b="1" dirty="0" err="1"/>
+              <a:t>Repair</a:t>
+            </a:r>
+            <a:r>
+              <a:rPr lang="pt-PT" b="1" dirty="0"/>
+              <a:t> </a:t>
+            </a:r>
+            <a:r>
+              <a:rPr lang="pt-PT" b="1" dirty="0" err="1"/>
+              <a:t>Enterprises</a:t>
+            </a:r>
+            <a:r>
+              <a:rPr lang="pt-PT" b="1" dirty="0"/>
+              <a:t>:</a:t>
             </a:r>
           </a:p>
           <a:p>
@@ -5956,7 +6000,7 @@
             </a:pPr>
             <a:r>
               <a:rPr lang="pt-PT" dirty="0"/>
-              <a:t>Por Estado de Empregação</a:t>
+              <a:t>Por Endereço</a:t>
             </a:r>
           </a:p>
           <a:p>
@@ -5968,7 +6012,83 @@
               <a:rPr lang="pt-PT" dirty="0"/>
               <a:t>Por Nome</a:t>
             </a:r>
-            <a:endParaRPr lang="pt-PT" b="1" dirty="0"/>
+          </a:p>
+          <a:p>
+            <a:endParaRPr lang="pt-PT" dirty="0"/>
+          </a:p>
+        </p:txBody>
+      </p:sp>
+      <p:sp>
+        <p:nvSpPr>
+          <p:cNvPr id="7" name="Retângulo 6">
+            <a:extLst>
+              <a:ext uri="{FF2B5EF4-FFF2-40B4-BE49-F238E27FC236}">
+                <a16:creationId xmlns:a16="http://schemas.microsoft.com/office/drawing/2014/main" id="{23CB25D5-44F3-4E44-A028-4165A538097E}"/>
+              </a:ext>
+            </a:extLst>
+          </p:cNvPr>
+          <p:cNvSpPr/>
+          <p:nvPr/>
+        </p:nvSpPr>
+        <p:spPr>
+          <a:xfrm>
+            <a:off x="876627" y="1135956"/>
+            <a:ext cx="10890811" cy="3365024"/>
+          </a:xfrm>
+          <a:prstGeom prst="rect">
+            <a:avLst/>
+          </a:prstGeom>
+        </p:spPr>
+        <p:txBody>
+          <a:bodyPr wrap="square">
+            <a:spAutoFit/>
+          </a:bodyPr>
+          <a:lstStyle/>
+          <a:p>
+            <a:pPr marL="285750" indent="-285750">
+              <a:lnSpc>
+                <a:spcPct val="150000"/>
+              </a:lnSpc>
+              <a:buFont typeface="Wingdings" panose="05000000000000000000" pitchFamily="2" charset="2"/>
+              <a:buChar char="§"/>
+            </a:pPr>
+            <a:r>
+              <a:rPr lang="pt-PT" dirty="0"/>
+              <a:t>As Empresas de Eventos e as Empresas de Reparações ambas derivam de uma classe base Empresa Base, visto partilharem bastante informação semelhante. A classe Empresa Base foi definida para este trabalho e a antiga classe Empresa de Eventos foi adaptada para derivar desta.</a:t>
+            </a:r>
+          </a:p>
+          <a:p>
+            <a:pPr marL="285750" indent="-285750">
+              <a:lnSpc>
+                <a:spcPct val="150000"/>
+              </a:lnSpc>
+              <a:buFont typeface="Wingdings" panose="05000000000000000000" pitchFamily="2" charset="2"/>
+              <a:buChar char="§"/>
+            </a:pPr>
+            <a:endParaRPr lang="pt-PT" dirty="0"/>
+          </a:p>
+          <a:p>
+            <a:pPr marL="285750" indent="-285750">
+              <a:lnSpc>
+                <a:spcPct val="150000"/>
+              </a:lnSpc>
+              <a:buFont typeface="Wingdings" panose="05000000000000000000" pitchFamily="2" charset="2"/>
+              <a:buChar char="§"/>
+            </a:pPr>
+            <a:r>
+              <a:rPr lang="pt-PT" dirty="0"/>
+              <a:t>Todas as operações de listagem e seleção de aglomerados de informação têm filtros distintos para ajudar a navegar pela grande quantidade de dados apresentados pela Rede.  A acrescentar aos já presentes no trabalho anterior, destacam-se:</a:t>
+            </a:r>
+          </a:p>
+          <a:p>
+            <a:pPr marL="285750" indent="-285750">
+              <a:lnSpc>
+                <a:spcPct val="150000"/>
+              </a:lnSpc>
+              <a:buFont typeface="Wingdings" panose="05000000000000000000" pitchFamily="2" charset="2"/>
+              <a:buChar char="§"/>
+            </a:pPr>
+            <a:endParaRPr lang="pt-PT" dirty="0"/>
           </a:p>
         </p:txBody>
       </p:sp>
@@ -6086,7 +6206,7 @@
         <p:spPr>
           <a:xfrm>
             <a:off x="876628" y="1171637"/>
-            <a:ext cx="10935477" cy="1098487"/>
+            <a:ext cx="10935477" cy="1533463"/>
           </a:xfrm>
         </p:spPr>
         <p:txBody>
@@ -6096,10 +6216,13 @@
           <a:lstStyle/>
           <a:p>
             <a:pPr marL="0" indent="0">
+              <a:lnSpc>
+                <a:spcPct val="150000"/>
+              </a:lnSpc>
               <a:buNone/>
             </a:pPr>
             <a:r>
-              <a:rPr lang="pt-PT" dirty="0">
+              <a:rPr lang="pt-PT" sz="1800" dirty="0">
                 <a:solidFill>
                   <a:schemeClr val="tx1"/>
                 </a:solidFill>
@@ -6130,7 +6253,7 @@
         </p:nvSpPr>
         <p:spPr>
           <a:xfrm>
-            <a:off x="6096000" y="3335600"/>
+            <a:off x="5995447" y="3704685"/>
             <a:ext cx="5421085" cy="2031325"/>
           </a:xfrm>
           <a:prstGeom prst="rect">
@@ -6229,7 +6352,7 @@
         <p:spPr>
           <a:xfrm>
             <a:off x="1403246" y="2873689"/>
-            <a:ext cx="4592201" cy="3139321"/>
+            <a:ext cx="4592201" cy="3693319"/>
           </a:xfrm>
           <a:prstGeom prst="rect">
             <a:avLst/>
@@ -6282,6 +6405,13 @@
             </a:r>
           </a:p>
           <a:p>
+            <a:pPr marL="742950" lvl="1" indent="-285750">
+              <a:buFont typeface="Arial" panose="020B0604020202020204" pitchFamily="34" charset="0"/>
+              <a:buChar char="–"/>
+            </a:pPr>
+            <a:endParaRPr lang="pt-PT" dirty="0"/>
+          </a:p>
+          <a:p>
             <a:pPr marL="285750" indent="-285750">
               <a:buFont typeface="Wingdings" panose="05000000000000000000" pitchFamily="2" charset="2"/>
               <a:buChar char="§"/>
@@ -6317,9 +6447,20 @@
               <a:buFont typeface="Wingdings" panose="05000000000000000000" pitchFamily="2" charset="2"/>
               <a:buChar char="§"/>
             </a:pPr>
+            <a:endParaRPr lang="pt-PT" b="1" dirty="0"/>
+          </a:p>
+          <a:p>
+            <a:pPr marL="285750" indent="-285750">
+              <a:buFont typeface="Wingdings" panose="05000000000000000000" pitchFamily="2" charset="2"/>
+              <a:buChar char="§"/>
+            </a:pPr>
+            <a:r>
+              <a:rPr lang="pt-PT" b="1" dirty="0" err="1"/>
+              <a:t>Sort</a:t>
+            </a:r>
             <a:r>
               <a:rPr lang="pt-PT" b="1" dirty="0"/>
-              <a:t>Sort de Cartões:</a:t>
+              <a:t> de Cartões:</a:t>
             </a:r>
           </a:p>
           <a:p>
@@ -6467,28 +6608,68 @@
         </p:nvSpPr>
         <p:spPr>
           <a:xfrm>
-            <a:off x="1102661" y="1476660"/>
-            <a:ext cx="10010098" cy="5143020"/>
+            <a:off x="1102661" y="1187777"/>
+            <a:ext cx="10010098" cy="5431903"/>
           </a:xfrm>
         </p:spPr>
         <p:txBody>
           <a:bodyPr>
-            <a:normAutofit/>
+            <a:normAutofit fontScale="92500" lnSpcReduction="20000"/>
           </a:bodyPr>
           <a:lstStyle/>
           <a:p>
-            <a:pPr algn="just"/>
+            <a:pPr algn="just">
+              <a:lnSpc>
+                <a:spcPct val="150000"/>
+              </a:lnSpc>
+            </a:pPr>
             <a:r>
               <a:rPr lang="pt-PT" dirty="0">
                 <a:solidFill>
                   <a:schemeClr val="tx1"/>
                 </a:solidFill>
               </a:rPr>
-              <a:t>A pesquisa de Empresas de Reparação para reparar um edifício (Museu) à escolha do utilizador:</a:t>
-            </a:r>
-          </a:p>
-          <a:p>
-            <a:pPr lvl="1" algn="just"/>
+              <a:t>A pesquisa de empresas (</a:t>
+            </a:r>
+            <a:r>
+              <a:rPr lang="pt-PT" dirty="0" err="1">
+                <a:solidFill>
+                  <a:schemeClr val="tx1"/>
+                </a:solidFill>
+              </a:rPr>
+              <a:t>RepairEnterprises</a:t>
+            </a:r>
+            <a:r>
+              <a:rPr lang="pt-PT" dirty="0">
+                <a:solidFill>
+                  <a:schemeClr val="tx1"/>
+                </a:solidFill>
+              </a:rPr>
+              <a:t>), para reparar um edifício (</a:t>
+            </a:r>
+            <a:r>
+              <a:rPr lang="pt-PT" dirty="0" err="1">
+                <a:solidFill>
+                  <a:schemeClr val="tx1"/>
+                </a:solidFill>
+              </a:rPr>
+              <a:t>Museum</a:t>
+            </a:r>
+            <a:r>
+              <a:rPr lang="pt-PT" dirty="0">
+                <a:solidFill>
+                  <a:schemeClr val="tx1"/>
+                </a:solidFill>
+              </a:rPr>
+              <a:t>) à escolha do utilizador:</a:t>
+            </a:r>
+          </a:p>
+          <a:p>
+            <a:pPr lvl="1" algn="just">
+              <a:lnSpc>
+                <a:spcPct val="150000"/>
+              </a:lnSpc>
+            </a:pPr>
             <a:r>
               <a:rPr lang="pt-PT" i="0" dirty="0">
                 <a:solidFill>
@@ -6499,18 +6680,55 @@
             </a:r>
           </a:p>
           <a:p>
-            <a:pPr lvl="1" algn="just"/>
+            <a:pPr lvl="1" algn="just">
+              <a:lnSpc>
+                <a:spcPct val="150000"/>
+              </a:lnSpc>
+            </a:pPr>
             <a:r>
               <a:rPr lang="pt-PT" i="0" dirty="0">
                 <a:solidFill>
                   <a:schemeClr val="tx1"/>
                 </a:solidFill>
               </a:rPr>
-              <a:t>Após iterar sobre todos os elementos ou encontrar um que corresponda à pesquisa, os elementos são reinseridos.</a:t>
-            </a:r>
-          </a:p>
-          <a:p>
-            <a:pPr algn="just"/>
+              <a:t>Após iterar sobre todos os elementos ou encontrar um que corresponda à pesquisa, os elementos na </a:t>
+            </a:r>
+            <a:r>
+              <a:rPr lang="pt-PT" i="0" dirty="0" err="1">
+                <a:solidFill>
+                  <a:schemeClr val="tx1"/>
+                </a:solidFill>
+              </a:rPr>
+              <a:t>stack</a:t>
+            </a:r>
+            <a:r>
+              <a:rPr lang="pt-PT" i="0" dirty="0">
+                <a:solidFill>
+                  <a:schemeClr val="tx1"/>
+                </a:solidFill>
+              </a:rPr>
+              <a:t> são reinseridos.</a:t>
+            </a:r>
+          </a:p>
+          <a:p>
+            <a:pPr marL="530352" lvl="1" indent="0" algn="just">
+              <a:lnSpc>
+                <a:spcPct val="150000"/>
+              </a:lnSpc>
+              <a:buNone/>
+            </a:pPr>
+            <a:endParaRPr lang="pt-PT" i="0" dirty="0">
+              <a:solidFill>
+                <a:schemeClr val="tx1"/>
+              </a:solidFill>
+            </a:endParaRPr>
+          </a:p>
+          <a:p>
+            <a:pPr algn="just">
+              <a:lnSpc>
+                <a:spcPct val="150000"/>
+              </a:lnSpc>
+            </a:pPr>
             <a:r>
               <a:rPr lang="pt-PT" dirty="0">
                 <a:solidFill>
@@ -6521,7 +6739,11 @@
             </a:r>
           </a:p>
           <a:p>
-            <a:pPr lvl="1" algn="just"/>
+            <a:pPr lvl="1" algn="just">
+              <a:lnSpc>
+                <a:spcPct val="150000"/>
+              </a:lnSpc>
+            </a:pPr>
             <a:r>
               <a:rPr lang="pt-PT" i="0" dirty="0">
                 <a:solidFill>
@@ -6548,7 +6770,11 @@
             </a:r>
           </a:p>
           <a:p>
-            <a:pPr lvl="1" algn="just"/>
+            <a:pPr lvl="1" algn="just">
+              <a:lnSpc>
+                <a:spcPct val="150000"/>
+              </a:lnSpc>
+            </a:pPr>
             <a:r>
               <a:rPr lang="pt-PT" i="0" dirty="0">
                 <a:solidFill>
@@ -6559,7 +6785,11 @@
             </a:r>
           </a:p>
           <a:p>
-            <a:pPr lvl="1" algn="just"/>
+            <a:pPr lvl="1" algn="just">
+              <a:lnSpc>
+                <a:spcPct val="150000"/>
+              </a:lnSpc>
+            </a:pPr>
             <a:r>
               <a:rPr lang="pt-PT" i="0" dirty="0">
                 <a:solidFill>
@@ -6704,40 +6934,84 @@
         </p:spPr>
         <p:txBody>
           <a:bodyPr>
-            <a:normAutofit/>
+            <a:normAutofit lnSpcReduction="10000"/>
           </a:bodyPr>
           <a:lstStyle/>
           <a:p>
-            <a:pPr fontAlgn="base"/>
+            <a:pPr fontAlgn="base">
+              <a:lnSpc>
+                <a:spcPct val="150000"/>
+              </a:lnSpc>
+            </a:pPr>
             <a:r>
               <a:rPr lang="pt-PT" dirty="0"/>
-              <a:t>O trabalho foi distribuído de maneira homogénea por todos os elementos do grupo</a:t>
-            </a:r>
-          </a:p>
-          <a:p>
-            <a:pPr fontAlgn="base"/>
+              <a:t>O trabalho foi distribuído de maneira homogénea por todos os elementos do grupo.</a:t>
+            </a:r>
+          </a:p>
+          <a:p>
+            <a:pPr fontAlgn="base">
+              <a:lnSpc>
+                <a:spcPct val="150000"/>
+              </a:lnSpc>
+            </a:pPr>
             <a:r>
               <a:rPr lang="pt-PT" dirty="0"/>
               <a:t>As principais dificuldades encontradas foram: </a:t>
             </a:r>
           </a:p>
           <a:p>
-            <a:pPr lvl="1" fontAlgn="base"/>
+            <a:pPr lvl="1" fontAlgn="base">
+              <a:lnSpc>
+                <a:spcPct val="150000"/>
+              </a:lnSpc>
+            </a:pPr>
             <a:r>
               <a:rPr lang="pt-PT" i="0" dirty="0"/>
-              <a:t>O uso de estruturas não lineares dificultoi o uso dos filters do nossos menus: devíamos ter usado iteradores desde o início. A filtragem de ‘std::set’ continua eficiente, mas o código já não é tão geral.</a:t>
-            </a:r>
-          </a:p>
-          <a:p>
-            <a:pPr lvl="1" fontAlgn="base"/>
+              <a:t>O uso de estruturas não lineares dificultou o uso dos filtros dos nossos menus: os filtros deviam ter sido implementados com recurso a </a:t>
+            </a:r>
+            <a:r>
+              <a:rPr lang="pt-PT" i="0" dirty="0" err="1"/>
+              <a:t>iteradores</a:t>
+            </a:r>
             <a:r>
               <a:rPr lang="pt-PT" i="0" dirty="0"/>
-              <a:t>A forma como o operador ‘&lt;‘ foi definido para a BST de museus (pedido no enunciado) dificulta a procura de museus na BST (comparação de igualdade entre museus não pode ser feita com o uso do operador ‘&lt;‘). O grupo concorda que este operador não permite utilizar ao máximo as propriedades de uma BST, mas seguimos o enunciado.</a:t>
-            </a:r>
-          </a:p>
-          <a:p>
-            <a:pPr lvl="1" fontAlgn="base"/>
-            <a:endParaRPr lang="pt-PT" i="0" dirty="0"/>
+              <a:t>, por vez de vetores; a filtragem de ‘</a:t>
+            </a:r>
+            <a:r>
+              <a:rPr lang="pt-PT" i="0" dirty="0" err="1"/>
+              <a:t>std</a:t>
+            </a:r>
+            <a:r>
+              <a:rPr lang="pt-PT" i="0" dirty="0"/>
+              <a:t>::set’ continua eficiente, mas o código já não é tão geral.</a:t>
+            </a:r>
+          </a:p>
+          <a:p>
+            <a:pPr lvl="1" fontAlgn="base">
+              <a:lnSpc>
+                <a:spcPct val="150000"/>
+              </a:lnSpc>
+            </a:pPr>
+            <a:r>
+              <a:rPr lang="pt-PT" i="0" dirty="0"/>
+              <a:t>A forma como o operador ‘&lt;‘ foi definido para a </a:t>
+            </a:r>
+            <a:r>
+              <a:rPr lang="pt-PT" b="1" i="0" dirty="0"/>
+              <a:t>BST</a:t>
+            </a:r>
+            <a:r>
+              <a:rPr lang="pt-PT" i="0" dirty="0"/>
+              <a:t> de museus (a pedido do enunciado) dificulta a procura de museus nesta (comparação de igualdade entre museus não pode ser feita com o uso do operador ‘&lt;‘ descrito). O grupo conclui que este operador não permite usufruir de todas as vantagens de uma </a:t>
+            </a:r>
+            <a:r>
+              <a:rPr lang="pt-PT" b="1" i="0" dirty="0"/>
+              <a:t>BST </a:t>
+            </a:r>
+            <a:r>
+              <a:rPr lang="pt-PT" i="0" dirty="0"/>
+              <a:t>(nomeadamente a procura).</a:t>
+            </a:r>
           </a:p>
         </p:txBody>
       </p:sp>
@@ -7308,9 +7582,12 @@
 </file>
 
 <file path=customXml/item1.xml><?xml version="1.0" encoding="utf-8"?>
-<p:properties xmlns:p="http://schemas.microsoft.com/office/2006/metadata/properties" xmlns:xsi="http://www.w3.org/2001/XMLSchema-instance" xmlns:pc="http://schemas.microsoft.com/office/infopath/2007/PartnerControls">
-  <documentManagement/>
-</p:properties>
+<?mso-contentType ?>
+<FormTemplates xmlns="http://schemas.microsoft.com/sharepoint/v3/contenttype/forms">
+  <Display>DocumentLibraryForm</Display>
+  <Edit>DocumentLibraryForm</Edit>
+  <New>DocumentLibraryForm</New>
+</FormTemplates>
 </file>
 
 <file path=customXml/item2.xml><?xml version="1.0" encoding="utf-8"?>
@@ -7484,26 +7761,15 @@
 </file>
 
 <file path=customXml/item3.xml><?xml version="1.0" encoding="utf-8"?>
-<?mso-contentType ?>
-<FormTemplates xmlns="http://schemas.microsoft.com/sharepoint/v3/contenttype/forms">
-  <Display>DocumentLibraryForm</Display>
-  <Edit>DocumentLibraryForm</Edit>
-  <New>DocumentLibraryForm</New>
-</FormTemplates>
+<p:properties xmlns:p="http://schemas.microsoft.com/office/2006/metadata/properties" xmlns:xsi="http://www.w3.org/2001/XMLSchema-instance" xmlns:pc="http://schemas.microsoft.com/office/infopath/2007/PartnerControls">
+  <documentManagement/>
+</p:properties>
 </file>
 
 <file path=customXml/itemProps1.xml><?xml version="1.0" encoding="utf-8"?>
-<ds:datastoreItem xmlns:ds="http://schemas.openxmlformats.org/officeDocument/2006/customXml" ds:itemID="{C31DC4EE-CE8D-44D1-B01D-8FBB19F3B6D4}">
+<ds:datastoreItem xmlns:ds="http://schemas.openxmlformats.org/officeDocument/2006/customXml" ds:itemID="{7680A571-770C-406E-943B-80D479BFC2E3}">
   <ds:schemaRefs>
-    <ds:schemaRef ds:uri="http://purl.org/dc/dcmitype/"/>
-    <ds:schemaRef ds:uri="http://schemas.openxmlformats.org/package/2006/metadata/core-properties"/>
-    <ds:schemaRef ds:uri="http://purl.org/dc/elements/1.1/"/>
-    <ds:schemaRef ds:uri="http://purl.org/dc/terms/"/>
-    <ds:schemaRef ds:uri="http://schemas.microsoft.com/office/infopath/2007/PartnerControls"/>
-    <ds:schemaRef ds:uri="http://schemas.microsoft.com/office/2006/metadata/properties"/>
-    <ds:schemaRef ds:uri="http://schemas.microsoft.com/office/2006/documentManagement/types"/>
-    <ds:schemaRef ds:uri="6ce73d69-b8d4-4b83-a6ca-cd828de064d5"/>
-    <ds:schemaRef ds:uri="http://www.w3.org/XML/1998/namespace"/>
+    <ds:schemaRef ds:uri="http://schemas.microsoft.com/sharepoint/v3/contenttype/forms"/>
   </ds:schemaRefs>
 </ds:datastoreItem>
 </file>
@@ -7527,9 +7793,17 @@
 </file>
 
 <file path=customXml/itemProps3.xml><?xml version="1.0" encoding="utf-8"?>
-<ds:datastoreItem xmlns:ds="http://schemas.openxmlformats.org/officeDocument/2006/customXml" ds:itemID="{7680A571-770C-406E-943B-80D479BFC2E3}">
+<ds:datastoreItem xmlns:ds="http://schemas.openxmlformats.org/officeDocument/2006/customXml" ds:itemID="{C31DC4EE-CE8D-44D1-B01D-8FBB19F3B6D4}">
   <ds:schemaRefs>
-    <ds:schemaRef ds:uri="http://schemas.microsoft.com/sharepoint/v3/contenttype/forms"/>
+    <ds:schemaRef ds:uri="http://purl.org/dc/dcmitype/"/>
+    <ds:schemaRef ds:uri="http://schemas.openxmlformats.org/package/2006/metadata/core-properties"/>
+    <ds:schemaRef ds:uri="http://purl.org/dc/elements/1.1/"/>
+    <ds:schemaRef ds:uri="http://purl.org/dc/terms/"/>
+    <ds:schemaRef ds:uri="http://schemas.microsoft.com/office/infopath/2007/PartnerControls"/>
+    <ds:schemaRef ds:uri="http://schemas.microsoft.com/office/2006/metadata/properties"/>
+    <ds:schemaRef ds:uri="http://schemas.microsoft.com/office/2006/documentManagement/types"/>
+    <ds:schemaRef ds:uri="6ce73d69-b8d4-4b83-a6ca-cd828de064d5"/>
+    <ds:schemaRef ds:uri="http://www.w3.org/XML/1998/namespace"/>
   </ds:schemaRefs>
 </ds:datastoreItem>
 </file>
</xml_diff>